<commit_message>
basic functionality (tested on cart)
  - update supporting diagrams
  - update TWI master module (revert off-by-one fix which seemed to have broken this)
  - update TWI slave module
</commit_message>
<xml_diff>
--- a/Avatar_Micro_Robot/Robot_V2/Internal_Charger/trunk/supporting_files/I2C-SMBus_Diagram.pptx
+++ b/Avatar_Micro_Robot/Robot_V2/Internal_Charger/trunk/supporting_files/I2C-SMBus_Diagram.pptx
@@ -3699,8 +3699,8 @@
         </p:nvSpPr>
         <p:spPr>
           <a:xfrm>
-            <a:off x="3455011" y="311287"/>
-            <a:ext cx="2050626" cy="369332"/>
+            <a:off x="2681515" y="311287"/>
+            <a:ext cx="3775842" cy="369332"/>
           </a:xfrm>
           <a:prstGeom prst="rect">
             <a:avLst/>
@@ -3713,8 +3713,12 @@
           <a:lstStyle/>
           <a:p>
             <a:r>
+              <a:rPr lang="en-US" dirty="0" err="1" smtClean="0"/>
+              <a:t>InternalCharger</a:t>
+            </a:r>
+            <a:r>
               <a:rPr lang="en-US" dirty="0" smtClean="0"/>
-              <a:t>I2C/</a:t>
+              <a:t>: I2C/</a:t>
             </a:r>
             <a:r>
               <a:rPr lang="en-US" dirty="0" err="1" smtClean="0"/>
@@ -3722,7 +3726,7 @@
             </a:r>
             <a:r>
               <a:rPr lang="en-US" dirty="0" smtClean="0"/>
-              <a:t> Diagram</a:t>
+              <a:t> Interfaces</a:t>
             </a:r>
             <a:endParaRPr lang="en-US" dirty="0"/>
           </a:p>
@@ -4606,7 +4610,7 @@
             </a:r>
             <a:r>
               <a:rPr lang="en-US" sz="900" baseline="-25000" dirty="0" err="1" smtClean="0"/>
-              <a:t>A</a:t>
+              <a:t>B</a:t>
             </a:r>
             <a:endParaRPr lang="en-US" sz="900" baseline="-25000" dirty="0" smtClean="0"/>
           </a:p>
@@ -4654,7 +4658,7 @@
             </a:r>
             <a:r>
               <a:rPr lang="en-US" sz="900" baseline="-25000" dirty="0" err="1" smtClean="0"/>
-              <a:t>B</a:t>
+              <a:t>A</a:t>
             </a:r>
             <a:endParaRPr lang="en-US" sz="900" baseline="-25000" dirty="0" smtClean="0"/>
           </a:p>

</xml_diff>